<commit_message>
Task sheet Fix bug
</commit_message>
<xml_diff>
--- a/Document/OMCS_Slide re-defend.pptx
+++ b/Document/OMCS_Slide re-defend.pptx
@@ -10,9 +10,10 @@
     <p:sldId id="263" r:id="rId4"/>
     <p:sldId id="259" r:id="rId5"/>
     <p:sldId id="265" r:id="rId6"/>
-    <p:sldId id="264" r:id="rId7"/>
-    <p:sldId id="266" r:id="rId8"/>
-    <p:sldId id="262" r:id="rId9"/>
+    <p:sldId id="267" r:id="rId7"/>
+    <p:sldId id="264" r:id="rId8"/>
+    <p:sldId id="266" r:id="rId9"/>
+    <p:sldId id="262" r:id="rId10"/>
   </p:sldIdLst>
   <p:sldSz cx="9144000" cy="6858000" type="screen4x3"/>
   <p:notesSz cx="6858000" cy="9144000"/>
@@ -3172,7 +3173,7 @@
           <a:p>
             <a:fld id="{3A911585-E7AF-4F9D-B4B2-D6F890EBD4FF}" type="datetimeFigureOut">
               <a:rPr lang="en-US" smtClean="0"/>
-              <a:t>9/23/2014</a:t>
+              <a:t>10/2/2014</a:t>
             </a:fld>
             <a:endParaRPr lang="en-US"/>
           </a:p>
@@ -3405,7 +3406,7 @@
           <a:p>
             <a:fld id="{3A911585-E7AF-4F9D-B4B2-D6F890EBD4FF}" type="datetimeFigureOut">
               <a:rPr lang="en-US" smtClean="0"/>
-              <a:t>9/23/2014</a:t>
+              <a:t>10/2/2014</a:t>
             </a:fld>
             <a:endParaRPr lang="en-US"/>
           </a:p>
@@ -3590,7 +3591,7 @@
           <a:p>
             <a:fld id="{3A911585-E7AF-4F9D-B4B2-D6F890EBD4FF}" type="datetimeFigureOut">
               <a:rPr lang="en-US" smtClean="0"/>
-              <a:t>9/23/2014</a:t>
+              <a:t>10/2/2014</a:t>
             </a:fld>
             <a:endParaRPr lang="en-US"/>
           </a:p>
@@ -3740,7 +3741,7 @@
           <a:p>
             <a:fld id="{3A911585-E7AF-4F9D-B4B2-D6F890EBD4FF}" type="datetimeFigureOut">
               <a:rPr lang="en-US" smtClean="0"/>
-              <a:t>9/23/2014</a:t>
+              <a:t>10/2/2014</a:t>
             </a:fld>
             <a:endParaRPr lang="en-US"/>
           </a:p>
@@ -4070,7 +4071,7 @@
           <a:p>
             <a:fld id="{3A911585-E7AF-4F9D-B4B2-D6F890EBD4FF}" type="datetimeFigureOut">
               <a:rPr lang="en-US" smtClean="0"/>
-              <a:t>9/23/2014</a:t>
+              <a:t>10/2/2014</a:t>
             </a:fld>
             <a:endParaRPr lang="en-US"/>
           </a:p>
@@ -4486,7 +4487,7 @@
           <a:p>
             <a:fld id="{3A911585-E7AF-4F9D-B4B2-D6F890EBD4FF}" type="datetimeFigureOut">
               <a:rPr lang="en-US" smtClean="0"/>
-              <a:t>9/23/2014</a:t>
+              <a:t>10/2/2014</a:t>
             </a:fld>
             <a:endParaRPr lang="en-US"/>
           </a:p>
@@ -4939,7 +4940,7 @@
           <a:p>
             <a:fld id="{3A911585-E7AF-4F9D-B4B2-D6F890EBD4FF}" type="datetimeFigureOut">
               <a:rPr lang="en-US" smtClean="0"/>
-              <a:t>9/23/2014</a:t>
+              <a:t>10/2/2014</a:t>
             </a:fld>
             <a:endParaRPr lang="en-US"/>
           </a:p>
@@ -5040,7 +5041,7 @@
           <a:p>
             <a:fld id="{3A911585-E7AF-4F9D-B4B2-D6F890EBD4FF}" type="datetimeFigureOut">
               <a:rPr lang="en-US" smtClean="0"/>
-              <a:t>9/23/2014</a:t>
+              <a:t>10/2/2014</a:t>
             </a:fld>
             <a:endParaRPr lang="en-US"/>
           </a:p>
@@ -5161,7 +5162,7 @@
           <a:p>
             <a:fld id="{3A911585-E7AF-4F9D-B4B2-D6F890EBD4FF}" type="datetimeFigureOut">
               <a:rPr lang="en-US" smtClean="0"/>
-              <a:t>9/23/2014</a:t>
+              <a:t>10/2/2014</a:t>
             </a:fld>
             <a:endParaRPr lang="en-US"/>
           </a:p>
@@ -5465,7 +5466,7 @@
           <a:p>
             <a:fld id="{3A911585-E7AF-4F9D-B4B2-D6F890EBD4FF}" type="datetimeFigureOut">
               <a:rPr lang="en-US" smtClean="0"/>
-              <a:t>9/23/2014</a:t>
+              <a:t>10/2/2014</a:t>
             </a:fld>
             <a:endParaRPr lang="en-US"/>
           </a:p>
@@ -5670,7 +5671,7 @@
           <a:p>
             <a:fld id="{3A911585-E7AF-4F9D-B4B2-D6F890EBD4FF}" type="datetimeFigureOut">
               <a:rPr lang="en-US" smtClean="0"/>
-              <a:t>9/23/2014</a:t>
+              <a:t>10/2/2014</a:t>
             </a:fld>
             <a:endParaRPr lang="en-US"/>
           </a:p>
@@ -6779,7 +6780,7 @@
           <a:p>
             <a:fld id="{3A911585-E7AF-4F9D-B4B2-D6F890EBD4FF}" type="datetimeFigureOut">
               <a:rPr lang="en-US" smtClean="0"/>
-              <a:t>9/23/2014</a:t>
+              <a:t>10/2/2014</a:t>
             </a:fld>
             <a:endParaRPr lang="en-US"/>
           </a:p>
@@ -7624,7 +7625,7 @@
         </p:blipFill>
         <p:spPr bwMode="auto">
           <a:xfrm>
-            <a:off x="518885" y="1636147"/>
+            <a:off x="455325" y="2682249"/>
             <a:ext cx="1676400" cy="1676400"/>
           </a:xfrm>
           <a:prstGeom prst="rect">
@@ -7650,7 +7651,7 @@
         </p:nvSpPr>
         <p:spPr>
           <a:xfrm>
-            <a:off x="3262085" y="2089207"/>
+            <a:off x="3198525" y="3135309"/>
             <a:ext cx="2438400" cy="770279"/>
           </a:xfrm>
           <a:prstGeom prst="rect">
@@ -7693,7 +7694,7 @@
         </p:nvSpPr>
         <p:spPr>
           <a:xfrm>
-            <a:off x="6705597" y="1224619"/>
+            <a:off x="6667438" y="1303251"/>
             <a:ext cx="1919516" cy="609600"/>
           </a:xfrm>
           <a:prstGeom prst="rect">
@@ -7737,7 +7738,7 @@
         </p:nvSpPr>
         <p:spPr>
           <a:xfrm>
-            <a:off x="6694713" y="2139019"/>
+            <a:off x="6656553" y="2217651"/>
             <a:ext cx="1905000" cy="593042"/>
           </a:xfrm>
           <a:prstGeom prst="rect">
@@ -7784,7 +7785,7 @@
         </p:nvCxnSpPr>
         <p:spPr>
           <a:xfrm>
-            <a:off x="2195285" y="2474347"/>
+            <a:off x="2131725" y="3520449"/>
             <a:ext cx="1066800" cy="0"/>
           </a:xfrm>
           <a:prstGeom prst="straightConnector1">
@@ -7820,8 +7821,8 @@
         </p:nvCxnSpPr>
         <p:spPr>
           <a:xfrm flipV="1">
-            <a:off x="5700485" y="1529419"/>
-            <a:ext cx="1005112" cy="944928"/>
+            <a:off x="5636925" y="1608051"/>
+            <a:ext cx="1030513" cy="1912398"/>
           </a:xfrm>
           <a:prstGeom prst="straightConnector1">
             <a:avLst/>
@@ -7856,8 +7857,8 @@
         </p:nvCxnSpPr>
         <p:spPr>
           <a:xfrm flipV="1">
-            <a:off x="5700485" y="2435540"/>
-            <a:ext cx="994228" cy="38807"/>
+            <a:off x="5636925" y="2514172"/>
+            <a:ext cx="1019628" cy="1006277"/>
           </a:xfrm>
           <a:prstGeom prst="straightConnector1">
             <a:avLst/>
@@ -7914,7 +7915,7 @@
         </p:nvSpPr>
         <p:spPr>
           <a:xfrm>
-            <a:off x="823685" y="3446001"/>
+            <a:off x="760125" y="4492103"/>
             <a:ext cx="939681" cy="369332"/>
           </a:xfrm>
           <a:prstGeom prst="rect">
@@ -7944,7 +7945,7 @@
         </p:nvSpPr>
         <p:spPr>
           <a:xfrm>
-            <a:off x="6767285" y="3056677"/>
+            <a:off x="6681954" y="3135309"/>
             <a:ext cx="1905000" cy="593042"/>
           </a:xfrm>
           <a:prstGeom prst="rect">
@@ -7990,9 +7991,9 @@
           <p:nvPr/>
         </p:nvCxnSpPr>
         <p:spPr>
-          <a:xfrm>
-            <a:off x="5700485" y="2474347"/>
-            <a:ext cx="1066800" cy="878851"/>
+          <a:xfrm flipV="1">
+            <a:off x="5636925" y="3431830"/>
+            <a:ext cx="1045029" cy="88619"/>
           </a:xfrm>
           <a:prstGeom prst="straightConnector1">
             <a:avLst/>
@@ -8016,87 +8017,16 @@
           </a:fontRef>
         </p:style>
       </p:cxnSp>
-      <p:pic>
-        <p:nvPicPr>
-          <p:cNvPr id="40" name="Picture 2" descr="C:\Users\danhtc\Desktop\People-Patient-Male-icon.png"/>
-          <p:cNvPicPr>
-            <a:picLocks noChangeAspect="1" noChangeArrowheads="1"/>
-          </p:cNvPicPr>
-          <p:nvPr/>
-        </p:nvPicPr>
-        <p:blipFill>
-          <a:blip r:embed="rId3">
-            <a:extLst>
-              <a:ext uri="{28A0092B-C50C-407E-A947-70E740481C1C}">
-                <a14:useLocalDpi xmlns:a14="http://schemas.microsoft.com/office/drawing/2010/main" val="0"/>
-              </a:ext>
-            </a:extLst>
-          </a:blip>
-          <a:srcRect/>
-          <a:stretch>
-            <a:fillRect/>
-          </a:stretch>
-        </p:blipFill>
-        <p:spPr bwMode="auto">
-          <a:xfrm>
-            <a:off x="2494643" y="3750019"/>
-            <a:ext cx="1905000" cy="1905000"/>
-          </a:xfrm>
-          <a:prstGeom prst="rect">
-            <a:avLst/>
-          </a:prstGeom>
-          <a:noFill/>
-          <a:extLst>
-            <a:ext uri="{909E8E84-426E-40DD-AFC4-6F175D3DCCD1}">
-              <a14:hiddenFill xmlns:a14="http://schemas.microsoft.com/office/drawing/2010/main">
-                <a:solidFill>
-                  <a:srgbClr val="FFFFFF"/>
-                </a:solidFill>
-              </a14:hiddenFill>
-            </a:ext>
-          </a:extLst>
-        </p:spPr>
-      </p:pic>
-      <p:sp>
-        <p:nvSpPr>
-          <p:cNvPr id="41" name="TextBox 40"/>
-          <p:cNvSpPr txBox="1"/>
+      <p:sp>
+        <p:nvSpPr>
+          <p:cNvPr id="17" name="Rectangle 16"/>
+          <p:cNvSpPr/>
           <p:nvPr/>
         </p:nvSpPr>
         <p:spPr>
           <a:xfrm>
-            <a:off x="2723243" y="5712043"/>
-            <a:ext cx="952505" cy="369332"/>
-          </a:xfrm>
-          <a:prstGeom prst="rect">
-            <a:avLst/>
-          </a:prstGeom>
-          <a:noFill/>
-        </p:spPr>
-        <p:txBody>
-          <a:bodyPr wrap="none" rtlCol="0">
-            <a:spAutoFit/>
-          </a:bodyPr>
-          <a:lstStyle/>
-          <a:p>
-            <a:r>
-              <a:rPr lang="en-US" dirty="0" smtClean="0"/>
-              <a:t>Patient</a:t>
-            </a:r>
-            <a:endParaRPr lang="en-US" dirty="0"/>
-          </a:p>
-        </p:txBody>
-      </p:sp>
-      <p:sp>
-        <p:nvSpPr>
-          <p:cNvPr id="42" name="Rectangle 41"/>
-          <p:cNvSpPr/>
-          <p:nvPr/>
-        </p:nvSpPr>
-        <p:spPr>
-          <a:xfrm>
-            <a:off x="6186713" y="4572000"/>
-            <a:ext cx="2438400" cy="770279"/>
+            <a:off x="6674696" y="4035075"/>
+            <a:ext cx="1919516" cy="609600"/>
           </a:xfrm>
           <a:prstGeom prst="rect">
             <a:avLst/>
@@ -8125,23 +8055,105 @@
             <a:pPr algn="ctr"/>
             <a:r>
               <a:rPr lang="en-US" dirty="0" smtClean="0"/>
-              <a:t>View treatment history</a:t>
-            </a:r>
+              <a:t>Search patient</a:t>
+            </a:r>
+            <a:endParaRPr lang="en-US" dirty="0"/>
           </a:p>
         </p:txBody>
       </p:sp>
       <p:cxnSp>
         <p:nvCxnSpPr>
-          <p:cNvPr id="43" name="Straight Arrow Connector 42"/>
+          <p:cNvPr id="7" name="Straight Arrow Connector 6"/>
           <p:cNvCxnSpPr>
-            <a:endCxn id="42" idx="1"/>
+            <a:stCxn id="4" idx="3"/>
+            <a:endCxn id="17" idx="1"/>
           </p:cNvCxnSpPr>
           <p:nvPr/>
         </p:nvCxnSpPr>
         <p:spPr>
           <a:xfrm>
-            <a:off x="4267200" y="4927772"/>
-            <a:ext cx="1919513" cy="29368"/>
+            <a:off x="5636925" y="3520449"/>
+            <a:ext cx="1037771" cy="819426"/>
+          </a:xfrm>
+          <a:prstGeom prst="straightConnector1">
+            <a:avLst/>
+          </a:prstGeom>
+          <a:ln>
+            <a:tailEnd type="arrow"/>
+          </a:ln>
+        </p:spPr>
+        <p:style>
+          <a:lnRef idx="1">
+            <a:schemeClr val="accent1"/>
+          </a:lnRef>
+          <a:fillRef idx="0">
+            <a:schemeClr val="accent1"/>
+          </a:fillRef>
+          <a:effectRef idx="0">
+            <a:schemeClr val="accent1"/>
+          </a:effectRef>
+          <a:fontRef idx="minor">
+            <a:schemeClr val="tx1"/>
+          </a:fontRef>
+        </p:style>
+      </p:cxnSp>
+      <p:sp>
+        <p:nvSpPr>
+          <p:cNvPr id="27" name="Rectangle 26"/>
+          <p:cNvSpPr/>
+          <p:nvPr/>
+        </p:nvSpPr>
+        <p:spPr>
+          <a:xfrm>
+            <a:off x="6642037" y="4797075"/>
+            <a:ext cx="1919516" cy="609600"/>
+          </a:xfrm>
+          <a:prstGeom prst="rect">
+            <a:avLst/>
+          </a:prstGeom>
+        </p:spPr>
+        <p:style>
+          <a:lnRef idx="2">
+            <a:schemeClr val="accent1">
+              <a:shade val="50000"/>
+            </a:schemeClr>
+          </a:lnRef>
+          <a:fillRef idx="1">
+            <a:schemeClr val="accent1"/>
+          </a:fillRef>
+          <a:effectRef idx="0">
+            <a:schemeClr val="accent1"/>
+          </a:effectRef>
+          <a:fontRef idx="minor">
+            <a:schemeClr val="lt1"/>
+          </a:fontRef>
+        </p:style>
+        <p:txBody>
+          <a:bodyPr rtlCol="0" anchor="ctr"/>
+          <a:lstStyle/>
+          <a:p>
+            <a:pPr algn="ctr"/>
+            <a:r>
+              <a:rPr lang="en-US" dirty="0" smtClean="0"/>
+              <a:t>Create treatment</a:t>
+            </a:r>
+            <a:endParaRPr lang="en-US" dirty="0"/>
+          </a:p>
+        </p:txBody>
+      </p:sp>
+      <p:cxnSp>
+        <p:nvCxnSpPr>
+          <p:cNvPr id="15" name="Straight Arrow Connector 14"/>
+          <p:cNvCxnSpPr>
+            <a:stCxn id="4" idx="3"/>
+            <a:endCxn id="27" idx="1"/>
+          </p:cNvCxnSpPr>
+          <p:nvPr/>
+        </p:nvCxnSpPr>
+        <p:spPr>
+          <a:xfrm>
+            <a:off x="5636925" y="3520449"/>
+            <a:ext cx="1005112" cy="1581426"/>
           </a:xfrm>
           <a:prstGeom prst="straightConnector1">
             <a:avLst/>
@@ -8202,6 +8214,378 @@
           <a:chExt cx="0" cy="0"/>
         </a:xfrm>
       </p:grpSpPr>
+      <p:sp>
+        <p:nvSpPr>
+          <p:cNvPr id="8215" name="Title 8214"/>
+          <p:cNvSpPr>
+            <a:spLocks noGrp="1"/>
+          </p:cNvSpPr>
+          <p:nvPr>
+            <p:ph type="title"/>
+          </p:nvPr>
+        </p:nvSpPr>
+        <p:spPr/>
+        <p:txBody>
+          <a:bodyPr>
+            <a:normAutofit/>
+          </a:bodyPr>
+          <a:lstStyle/>
+          <a:p>
+            <a:r>
+              <a:rPr lang="en-US" sz="4000" dirty="0"/>
+              <a:t>New features</a:t>
+            </a:r>
+            <a:endParaRPr lang="en-US" dirty="0"/>
+          </a:p>
+        </p:txBody>
+      </p:sp>
+      <p:pic>
+        <p:nvPicPr>
+          <p:cNvPr id="40" name="Picture 2" descr="C:\Users\danhtc\Desktop\People-Patient-Male-icon.png"/>
+          <p:cNvPicPr>
+            <a:picLocks noChangeAspect="1" noChangeArrowheads="1"/>
+          </p:cNvPicPr>
+          <p:nvPr/>
+        </p:nvPicPr>
+        <p:blipFill>
+          <a:blip r:embed="rId2">
+            <a:extLst>
+              <a:ext uri="{28A0092B-C50C-407E-A947-70E740481C1C}">
+                <a14:useLocalDpi xmlns:a14="http://schemas.microsoft.com/office/drawing/2010/main" val="0"/>
+              </a:ext>
+            </a:extLst>
+          </a:blip>
+          <a:srcRect/>
+          <a:stretch>
+            <a:fillRect/>
+          </a:stretch>
+        </p:blipFill>
+        <p:spPr bwMode="auto">
+          <a:xfrm>
+            <a:off x="1364342" y="2482867"/>
+            <a:ext cx="1905000" cy="1905000"/>
+          </a:xfrm>
+          <a:prstGeom prst="rect">
+            <a:avLst/>
+          </a:prstGeom>
+          <a:noFill/>
+          <a:extLst>
+            <a:ext uri="{909E8E84-426E-40DD-AFC4-6F175D3DCCD1}">
+              <a14:hiddenFill xmlns:a14="http://schemas.microsoft.com/office/drawing/2010/main">
+                <a:solidFill>
+                  <a:srgbClr val="FFFFFF"/>
+                </a:solidFill>
+              </a14:hiddenFill>
+            </a:ext>
+          </a:extLst>
+        </p:spPr>
+      </p:pic>
+      <p:sp>
+        <p:nvSpPr>
+          <p:cNvPr id="41" name="TextBox 40"/>
+          <p:cNvSpPr txBox="1"/>
+          <p:nvPr/>
+        </p:nvSpPr>
+        <p:spPr>
+          <a:xfrm>
+            <a:off x="1603829" y="4481677"/>
+            <a:ext cx="952505" cy="369332"/>
+          </a:xfrm>
+          <a:prstGeom prst="rect">
+            <a:avLst/>
+          </a:prstGeom>
+          <a:noFill/>
+        </p:spPr>
+        <p:txBody>
+          <a:bodyPr wrap="none" rtlCol="0">
+            <a:spAutoFit/>
+          </a:bodyPr>
+          <a:lstStyle/>
+          <a:p>
+            <a:r>
+              <a:rPr lang="en-US" dirty="0" smtClean="0"/>
+              <a:t>Patient</a:t>
+            </a:r>
+            <a:endParaRPr lang="en-US" dirty="0"/>
+          </a:p>
+        </p:txBody>
+      </p:sp>
+      <p:sp>
+        <p:nvSpPr>
+          <p:cNvPr id="42" name="Rectangle 41"/>
+          <p:cNvSpPr/>
+          <p:nvPr/>
+        </p:nvSpPr>
+        <p:spPr>
+          <a:xfrm>
+            <a:off x="5334000" y="1773156"/>
+            <a:ext cx="2438400" cy="770279"/>
+          </a:xfrm>
+          <a:prstGeom prst="rect">
+            <a:avLst/>
+          </a:prstGeom>
+        </p:spPr>
+        <p:style>
+          <a:lnRef idx="2">
+            <a:schemeClr val="accent1">
+              <a:shade val="50000"/>
+            </a:schemeClr>
+          </a:lnRef>
+          <a:fillRef idx="1">
+            <a:schemeClr val="accent1"/>
+          </a:fillRef>
+          <a:effectRef idx="0">
+            <a:schemeClr val="accent1"/>
+          </a:effectRef>
+          <a:fontRef idx="minor">
+            <a:schemeClr val="lt1"/>
+          </a:fontRef>
+        </p:style>
+        <p:txBody>
+          <a:bodyPr rtlCol="0" anchor="ctr"/>
+          <a:lstStyle/>
+          <a:p>
+            <a:pPr algn="ctr"/>
+            <a:r>
+              <a:rPr lang="en-US" dirty="0" smtClean="0"/>
+              <a:t>View treatment history</a:t>
+            </a:r>
+          </a:p>
+        </p:txBody>
+      </p:sp>
+      <p:cxnSp>
+        <p:nvCxnSpPr>
+          <p:cNvPr id="43" name="Straight Arrow Connector 42"/>
+          <p:cNvCxnSpPr>
+            <a:stCxn id="40" idx="3"/>
+            <a:endCxn id="42" idx="1"/>
+          </p:cNvCxnSpPr>
+          <p:nvPr/>
+        </p:nvCxnSpPr>
+        <p:spPr>
+          <a:xfrm flipV="1">
+            <a:off x="3269342" y="2158296"/>
+            <a:ext cx="2064658" cy="1277071"/>
+          </a:xfrm>
+          <a:prstGeom prst="straightConnector1">
+            <a:avLst/>
+          </a:prstGeom>
+          <a:ln>
+            <a:tailEnd type="arrow"/>
+          </a:ln>
+        </p:spPr>
+        <p:style>
+          <a:lnRef idx="1">
+            <a:schemeClr val="accent1"/>
+          </a:lnRef>
+          <a:fillRef idx="0">
+            <a:schemeClr val="accent1"/>
+          </a:fillRef>
+          <a:effectRef idx="0">
+            <a:schemeClr val="accent1"/>
+          </a:effectRef>
+          <a:fontRef idx="minor">
+            <a:schemeClr val="tx1"/>
+          </a:fontRef>
+        </p:style>
+      </p:cxnSp>
+      <p:sp>
+        <p:nvSpPr>
+          <p:cNvPr id="32" name="Rectangle 31"/>
+          <p:cNvSpPr/>
+          <p:nvPr/>
+        </p:nvSpPr>
+        <p:spPr>
+          <a:xfrm>
+            <a:off x="5323114" y="3050228"/>
+            <a:ext cx="2438400" cy="770279"/>
+          </a:xfrm>
+          <a:prstGeom prst="rect">
+            <a:avLst/>
+          </a:prstGeom>
+        </p:spPr>
+        <p:style>
+          <a:lnRef idx="2">
+            <a:schemeClr val="accent1">
+              <a:shade val="50000"/>
+            </a:schemeClr>
+          </a:lnRef>
+          <a:fillRef idx="1">
+            <a:schemeClr val="accent1"/>
+          </a:fillRef>
+          <a:effectRef idx="0">
+            <a:schemeClr val="accent1"/>
+          </a:effectRef>
+          <a:fontRef idx="minor">
+            <a:schemeClr val="lt1"/>
+          </a:fontRef>
+        </p:style>
+        <p:txBody>
+          <a:bodyPr rtlCol="0" anchor="ctr"/>
+          <a:lstStyle/>
+          <a:p>
+            <a:pPr algn="ctr"/>
+            <a:r>
+              <a:rPr lang="en-US" dirty="0" smtClean="0"/>
+              <a:t>Request consult using form</a:t>
+            </a:r>
+            <a:endParaRPr lang="en-US" dirty="0" smtClean="0"/>
+          </a:p>
+        </p:txBody>
+      </p:sp>
+      <p:sp>
+        <p:nvSpPr>
+          <p:cNvPr id="33" name="Rectangle 32"/>
+          <p:cNvSpPr/>
+          <p:nvPr/>
+        </p:nvSpPr>
+        <p:spPr>
+          <a:xfrm>
+            <a:off x="5323114" y="4495800"/>
+            <a:ext cx="2438400" cy="770279"/>
+          </a:xfrm>
+          <a:prstGeom prst="rect">
+            <a:avLst/>
+          </a:prstGeom>
+        </p:spPr>
+        <p:style>
+          <a:lnRef idx="2">
+            <a:schemeClr val="accent1">
+              <a:shade val="50000"/>
+            </a:schemeClr>
+          </a:lnRef>
+          <a:fillRef idx="1">
+            <a:schemeClr val="accent1"/>
+          </a:fillRef>
+          <a:effectRef idx="0">
+            <a:schemeClr val="accent1"/>
+          </a:effectRef>
+          <a:fontRef idx="minor">
+            <a:schemeClr val="lt1"/>
+          </a:fontRef>
+        </p:style>
+        <p:txBody>
+          <a:bodyPr rtlCol="0" anchor="ctr"/>
+          <a:lstStyle/>
+          <a:p>
+            <a:pPr algn="ctr"/>
+            <a:r>
+              <a:rPr lang="en-US" dirty="0" smtClean="0"/>
+              <a:t>View position in waiting list</a:t>
+            </a:r>
+            <a:endParaRPr lang="en-US" dirty="0" smtClean="0"/>
+          </a:p>
+        </p:txBody>
+      </p:sp>
+      <p:cxnSp>
+        <p:nvCxnSpPr>
+          <p:cNvPr id="20" name="Straight Arrow Connector 19"/>
+          <p:cNvCxnSpPr>
+            <a:stCxn id="40" idx="3"/>
+            <a:endCxn id="33" idx="1"/>
+          </p:cNvCxnSpPr>
+          <p:nvPr/>
+        </p:nvCxnSpPr>
+        <p:spPr>
+          <a:xfrm>
+            <a:off x="3269342" y="3435367"/>
+            <a:ext cx="2053772" cy="1445573"/>
+          </a:xfrm>
+          <a:prstGeom prst="straightConnector1">
+            <a:avLst/>
+          </a:prstGeom>
+          <a:ln>
+            <a:tailEnd type="arrow"/>
+          </a:ln>
+        </p:spPr>
+        <p:style>
+          <a:lnRef idx="1">
+            <a:schemeClr val="accent1"/>
+          </a:lnRef>
+          <a:fillRef idx="0">
+            <a:schemeClr val="accent1"/>
+          </a:fillRef>
+          <a:effectRef idx="0">
+            <a:schemeClr val="accent1"/>
+          </a:effectRef>
+          <a:fontRef idx="minor">
+            <a:schemeClr val="tx1"/>
+          </a:fontRef>
+        </p:style>
+      </p:cxnSp>
+      <p:cxnSp>
+        <p:nvCxnSpPr>
+          <p:cNvPr id="10" name="Straight Arrow Connector 9"/>
+          <p:cNvCxnSpPr>
+            <a:stCxn id="40" idx="3"/>
+            <a:endCxn id="32" idx="1"/>
+          </p:cNvCxnSpPr>
+          <p:nvPr/>
+        </p:nvCxnSpPr>
+        <p:spPr>
+          <a:xfrm>
+            <a:off x="3269342" y="3435367"/>
+            <a:ext cx="2053772" cy="1"/>
+          </a:xfrm>
+          <a:prstGeom prst="straightConnector1">
+            <a:avLst/>
+          </a:prstGeom>
+          <a:ln>
+            <a:tailEnd type="arrow"/>
+          </a:ln>
+        </p:spPr>
+        <p:style>
+          <a:lnRef idx="1">
+            <a:schemeClr val="accent1"/>
+          </a:lnRef>
+          <a:fillRef idx="0">
+            <a:schemeClr val="accent1"/>
+          </a:fillRef>
+          <a:effectRef idx="0">
+            <a:schemeClr val="accent1"/>
+          </a:effectRef>
+          <a:fontRef idx="minor">
+            <a:schemeClr val="tx1"/>
+          </a:fontRef>
+        </p:style>
+      </p:cxnSp>
+    </p:spTree>
+    <p:extLst>
+      <p:ext uri="{BB962C8B-B14F-4D97-AF65-F5344CB8AC3E}">
+        <p14:creationId xmlns:p14="http://schemas.microsoft.com/office/powerpoint/2010/main" val="3829507605"/>
+      </p:ext>
+    </p:extLst>
+  </p:cSld>
+  <p:clrMapOvr>
+    <a:masterClrMapping/>
+  </p:clrMapOvr>
+  <p:timing>
+    <p:tnLst>
+      <p:par>
+        <p:cTn id="1" dur="indefinite" restart="never" nodeType="tmRoot"/>
+      </p:par>
+    </p:tnLst>
+  </p:timing>
+</p:sld>
+</file>
+
+<file path=ppt/slides/slide7.xml><?xml version="1.0" encoding="utf-8"?>
+<p:sld xmlns:a="http://schemas.openxmlformats.org/drawingml/2006/main" xmlns:r="http://schemas.openxmlformats.org/officeDocument/2006/relationships" xmlns:p="http://schemas.openxmlformats.org/presentationml/2006/main">
+  <p:cSld>
+    <p:spTree>
+      <p:nvGrpSpPr>
+        <p:cNvPr id="1" name=""/>
+        <p:cNvGrpSpPr/>
+        <p:nvPr/>
+      </p:nvGrpSpPr>
+      <p:grpSpPr>
+        <a:xfrm>
+          <a:off x="0" y="0"/>
+          <a:ext cx="0" cy="0"/>
+          <a:chOff x="0" y="0"/>
+          <a:chExt cx="0" cy="0"/>
+        </a:xfrm>
+      </p:grpSpPr>
       <p:graphicFrame>
         <p:nvGraphicFramePr>
           <p:cNvPr id="4" name="Content Placeholder 3"/>
@@ -8272,7 +8656,7 @@
 </p:sld>
 </file>
 
-<file path=ppt/slides/slide7.xml><?xml version="1.0" encoding="utf-8"?>
+<file path=ppt/slides/slide8.xml><?xml version="1.0" encoding="utf-8"?>
 <p:sld xmlns:a="http://schemas.openxmlformats.org/drawingml/2006/main" xmlns:r="http://schemas.openxmlformats.org/officeDocument/2006/relationships" xmlns:p="http://schemas.openxmlformats.org/presentationml/2006/main">
   <p:cSld>
     <p:spTree>
@@ -8365,7 +8749,7 @@
 </p:sld>
 </file>
 
-<file path=ppt/slides/slide8.xml><?xml version="1.0" encoding="utf-8"?>
+<file path=ppt/slides/slide9.xml><?xml version="1.0" encoding="utf-8"?>
 <p:sld xmlns:a="http://schemas.openxmlformats.org/drawingml/2006/main" xmlns:r="http://schemas.openxmlformats.org/officeDocument/2006/relationships" xmlns:p="http://schemas.openxmlformats.org/presentationml/2006/main">
   <p:cSld>
     <p:spTree>

</xml_diff>